<commit_message>
Robustness Experiments on Laptop
</commit_message>
<xml_diff>
--- a/Figures.pptx
+++ b/Figures.pptx
@@ -4,6 +4,9 @@
   <p:sldMasterIdLst>
     <p:sldMasterId id="2147483648" r:id="rId1"/>
   </p:sldMasterIdLst>
+  <p:notesMasterIdLst>
+    <p:notesMasterId r:id="rId14"/>
+  </p:notesMasterIdLst>
   <p:sldIdLst>
     <p:sldId id="256" r:id="rId2"/>
     <p:sldId id="262" r:id="rId3"/>
@@ -121,6 +124,454 @@
     </p:ext>
   </p:extLst>
 </p:presentation>
+</file>
+
+<file path=ppt/notesMasters/notesMaster1.xml><?xml version="1.0" encoding="utf-8"?>
+<p:notesMaster xmlns:a="http://schemas.openxmlformats.org/drawingml/2006/main" xmlns:r="http://schemas.openxmlformats.org/officeDocument/2006/relationships" xmlns:p="http://schemas.openxmlformats.org/presentationml/2006/main">
+  <p:cSld>
+    <p:bg>
+      <p:bgRef idx="1001">
+        <a:schemeClr val="bg1"/>
+      </p:bgRef>
+    </p:bg>
+    <p:spTree>
+      <p:nvGrpSpPr>
+        <p:cNvPr id="1" name=""/>
+        <p:cNvGrpSpPr/>
+        <p:nvPr/>
+      </p:nvGrpSpPr>
+      <p:grpSpPr>
+        <a:xfrm>
+          <a:off x="0" y="0"/>
+          <a:ext cx="0" cy="0"/>
+          <a:chOff x="0" y="0"/>
+          <a:chExt cx="0" cy="0"/>
+        </a:xfrm>
+      </p:grpSpPr>
+      <p:sp>
+        <p:nvSpPr>
+          <p:cNvPr id="2" name="Header Placeholder 1"/>
+          <p:cNvSpPr>
+            <a:spLocks noGrp="1"/>
+          </p:cNvSpPr>
+          <p:nvPr>
+            <p:ph type="hdr" sz="quarter"/>
+          </p:nvPr>
+        </p:nvSpPr>
+        <p:spPr>
+          <a:xfrm>
+            <a:off x="0" y="0"/>
+            <a:ext cx="2971800" cy="458788"/>
+          </a:xfrm>
+          <a:prstGeom prst="rect">
+            <a:avLst/>
+          </a:prstGeom>
+        </p:spPr>
+        <p:txBody>
+          <a:bodyPr vert="horz" lIns="91440" tIns="45720" rIns="91440" bIns="45720" rtlCol="0"/>
+          <a:lstStyle>
+            <a:lvl1pPr algn="l">
+              <a:defRPr sz="1200"/>
+            </a:lvl1pPr>
+          </a:lstStyle>
+          <a:p>
+            <a:endParaRPr lang="en-US"/>
+          </a:p>
+        </p:txBody>
+      </p:sp>
+      <p:sp>
+        <p:nvSpPr>
+          <p:cNvPr id="3" name="Date Placeholder 2"/>
+          <p:cNvSpPr>
+            <a:spLocks noGrp="1"/>
+          </p:cNvSpPr>
+          <p:nvPr>
+            <p:ph type="dt" idx="1"/>
+          </p:nvPr>
+        </p:nvSpPr>
+        <p:spPr>
+          <a:xfrm>
+            <a:off x="3884613" y="0"/>
+            <a:ext cx="2971800" cy="458788"/>
+          </a:xfrm>
+          <a:prstGeom prst="rect">
+            <a:avLst/>
+          </a:prstGeom>
+        </p:spPr>
+        <p:txBody>
+          <a:bodyPr vert="horz" lIns="91440" tIns="45720" rIns="91440" bIns="45720" rtlCol="0"/>
+          <a:lstStyle>
+            <a:lvl1pPr algn="r">
+              <a:defRPr sz="1200"/>
+            </a:lvl1pPr>
+          </a:lstStyle>
+          <a:p>
+            <a:fld id="{ACD158C3-9754-9447-BE10-13154554F86A}" type="datetimeFigureOut">
+              <a:rPr lang="en-US" smtClean="0"/>
+              <a:t>6/20/22</a:t>
+            </a:fld>
+            <a:endParaRPr lang="en-US"/>
+          </a:p>
+        </p:txBody>
+      </p:sp>
+      <p:sp>
+        <p:nvSpPr>
+          <p:cNvPr id="4" name="Slide Image Placeholder 3"/>
+          <p:cNvSpPr>
+            <a:spLocks noGrp="1" noRot="1" noChangeAspect="1"/>
+          </p:cNvSpPr>
+          <p:nvPr>
+            <p:ph type="sldImg" idx="2"/>
+          </p:nvPr>
+        </p:nvSpPr>
+        <p:spPr>
+          <a:xfrm>
+            <a:off x="685800" y="1143000"/>
+            <a:ext cx="5486400" cy="3086100"/>
+          </a:xfrm>
+          <a:prstGeom prst="rect">
+            <a:avLst/>
+          </a:prstGeom>
+          <a:noFill/>
+          <a:ln w="12700">
+            <a:solidFill>
+              <a:prstClr val="black"/>
+            </a:solidFill>
+          </a:ln>
+        </p:spPr>
+        <p:txBody>
+          <a:bodyPr vert="horz" lIns="91440" tIns="45720" rIns="91440" bIns="45720" rtlCol="0" anchor="ctr"/>
+          <a:lstStyle/>
+          <a:p>
+            <a:endParaRPr lang="en-US"/>
+          </a:p>
+        </p:txBody>
+      </p:sp>
+      <p:sp>
+        <p:nvSpPr>
+          <p:cNvPr id="5" name="Notes Placeholder 4"/>
+          <p:cNvSpPr>
+            <a:spLocks noGrp="1"/>
+          </p:cNvSpPr>
+          <p:nvPr>
+            <p:ph type="body" sz="quarter" idx="3"/>
+          </p:nvPr>
+        </p:nvSpPr>
+        <p:spPr>
+          <a:xfrm>
+            <a:off x="685800" y="4400550"/>
+            <a:ext cx="5486400" cy="3600450"/>
+          </a:xfrm>
+          <a:prstGeom prst="rect">
+            <a:avLst/>
+          </a:prstGeom>
+        </p:spPr>
+        <p:txBody>
+          <a:bodyPr vert="horz" lIns="91440" tIns="45720" rIns="91440" bIns="45720" rtlCol="0"/>
+          <a:lstStyle/>
+          <a:p>
+            <a:pPr lvl="0"/>
+            <a:r>
+              <a:rPr lang="en-US"/>
+              <a:t>Click to edit Master text styles</a:t>
+            </a:r>
+          </a:p>
+          <a:p>
+            <a:pPr lvl="1"/>
+            <a:r>
+              <a:rPr lang="en-US"/>
+              <a:t>Second level</a:t>
+            </a:r>
+          </a:p>
+          <a:p>
+            <a:pPr lvl="2"/>
+            <a:r>
+              <a:rPr lang="en-US"/>
+              <a:t>Third level</a:t>
+            </a:r>
+          </a:p>
+          <a:p>
+            <a:pPr lvl="3"/>
+            <a:r>
+              <a:rPr lang="en-US"/>
+              <a:t>Fourth level</a:t>
+            </a:r>
+          </a:p>
+          <a:p>
+            <a:pPr lvl="4"/>
+            <a:r>
+              <a:rPr lang="en-US"/>
+              <a:t>Fifth level</a:t>
+            </a:r>
+          </a:p>
+        </p:txBody>
+      </p:sp>
+      <p:sp>
+        <p:nvSpPr>
+          <p:cNvPr id="6" name="Footer Placeholder 5"/>
+          <p:cNvSpPr>
+            <a:spLocks noGrp="1"/>
+          </p:cNvSpPr>
+          <p:nvPr>
+            <p:ph type="ftr" sz="quarter" idx="4"/>
+          </p:nvPr>
+        </p:nvSpPr>
+        <p:spPr>
+          <a:xfrm>
+            <a:off x="0" y="8685213"/>
+            <a:ext cx="2971800" cy="458787"/>
+          </a:xfrm>
+          <a:prstGeom prst="rect">
+            <a:avLst/>
+          </a:prstGeom>
+        </p:spPr>
+        <p:txBody>
+          <a:bodyPr vert="horz" lIns="91440" tIns="45720" rIns="91440" bIns="45720" rtlCol="0" anchor="b"/>
+          <a:lstStyle>
+            <a:lvl1pPr algn="l">
+              <a:defRPr sz="1200"/>
+            </a:lvl1pPr>
+          </a:lstStyle>
+          <a:p>
+            <a:endParaRPr lang="en-US"/>
+          </a:p>
+        </p:txBody>
+      </p:sp>
+      <p:sp>
+        <p:nvSpPr>
+          <p:cNvPr id="7" name="Slide Number Placeholder 6"/>
+          <p:cNvSpPr>
+            <a:spLocks noGrp="1"/>
+          </p:cNvSpPr>
+          <p:nvPr>
+            <p:ph type="sldNum" sz="quarter" idx="5"/>
+          </p:nvPr>
+        </p:nvSpPr>
+        <p:spPr>
+          <a:xfrm>
+            <a:off x="3884613" y="8685213"/>
+            <a:ext cx="2971800" cy="458787"/>
+          </a:xfrm>
+          <a:prstGeom prst="rect">
+            <a:avLst/>
+          </a:prstGeom>
+        </p:spPr>
+        <p:txBody>
+          <a:bodyPr vert="horz" lIns="91440" tIns="45720" rIns="91440" bIns="45720" rtlCol="0" anchor="b"/>
+          <a:lstStyle>
+            <a:lvl1pPr algn="r">
+              <a:defRPr sz="1200"/>
+            </a:lvl1pPr>
+          </a:lstStyle>
+          <a:p>
+            <a:fld id="{536CD67C-AC1D-3C49-A666-99E7C6339AFD}" type="slidenum">
+              <a:rPr lang="en-US" smtClean="0"/>
+              <a:t>‹#›</a:t>
+            </a:fld>
+            <a:endParaRPr lang="en-US"/>
+          </a:p>
+        </p:txBody>
+      </p:sp>
+    </p:spTree>
+    <p:extLst>
+      <p:ext uri="{BB962C8B-B14F-4D97-AF65-F5344CB8AC3E}">
+        <p14:creationId xmlns:p14="http://schemas.microsoft.com/office/powerpoint/2010/main" val="2895090552"/>
+      </p:ext>
+    </p:extLst>
+  </p:cSld>
+  <p:clrMap bg1="lt1" tx1="dk1" bg2="lt2" tx2="dk2" accent1="accent1" accent2="accent2" accent3="accent3" accent4="accent4" accent5="accent5" accent6="accent6" hlink="hlink" folHlink="folHlink"/>
+  <p:notesStyle>
+    <a:lvl1pPr marL="0" algn="l" defTabSz="914400" rtl="0" eaLnBrk="1" latinLnBrk="0" hangingPunct="1">
+      <a:defRPr sz="1200" kern="1200">
+        <a:solidFill>
+          <a:schemeClr val="tx1"/>
+        </a:solidFill>
+        <a:latin typeface="+mn-lt"/>
+        <a:ea typeface="+mn-ea"/>
+        <a:cs typeface="+mn-cs"/>
+      </a:defRPr>
+    </a:lvl1pPr>
+    <a:lvl2pPr marL="457200" algn="l" defTabSz="914400" rtl="0" eaLnBrk="1" latinLnBrk="0" hangingPunct="1">
+      <a:defRPr sz="1200" kern="1200">
+        <a:solidFill>
+          <a:schemeClr val="tx1"/>
+        </a:solidFill>
+        <a:latin typeface="+mn-lt"/>
+        <a:ea typeface="+mn-ea"/>
+        <a:cs typeface="+mn-cs"/>
+      </a:defRPr>
+    </a:lvl2pPr>
+    <a:lvl3pPr marL="914400" algn="l" defTabSz="914400" rtl="0" eaLnBrk="1" latinLnBrk="0" hangingPunct="1">
+      <a:defRPr sz="1200" kern="1200">
+        <a:solidFill>
+          <a:schemeClr val="tx1"/>
+        </a:solidFill>
+        <a:latin typeface="+mn-lt"/>
+        <a:ea typeface="+mn-ea"/>
+        <a:cs typeface="+mn-cs"/>
+      </a:defRPr>
+    </a:lvl3pPr>
+    <a:lvl4pPr marL="1371600" algn="l" defTabSz="914400" rtl="0" eaLnBrk="1" latinLnBrk="0" hangingPunct="1">
+      <a:defRPr sz="1200" kern="1200">
+        <a:solidFill>
+          <a:schemeClr val="tx1"/>
+        </a:solidFill>
+        <a:latin typeface="+mn-lt"/>
+        <a:ea typeface="+mn-ea"/>
+        <a:cs typeface="+mn-cs"/>
+      </a:defRPr>
+    </a:lvl4pPr>
+    <a:lvl5pPr marL="1828800" algn="l" defTabSz="914400" rtl="0" eaLnBrk="1" latinLnBrk="0" hangingPunct="1">
+      <a:defRPr sz="1200" kern="1200">
+        <a:solidFill>
+          <a:schemeClr val="tx1"/>
+        </a:solidFill>
+        <a:latin typeface="+mn-lt"/>
+        <a:ea typeface="+mn-ea"/>
+        <a:cs typeface="+mn-cs"/>
+      </a:defRPr>
+    </a:lvl5pPr>
+    <a:lvl6pPr marL="2286000" algn="l" defTabSz="914400" rtl="0" eaLnBrk="1" latinLnBrk="0" hangingPunct="1">
+      <a:defRPr sz="1200" kern="1200">
+        <a:solidFill>
+          <a:schemeClr val="tx1"/>
+        </a:solidFill>
+        <a:latin typeface="+mn-lt"/>
+        <a:ea typeface="+mn-ea"/>
+        <a:cs typeface="+mn-cs"/>
+      </a:defRPr>
+    </a:lvl6pPr>
+    <a:lvl7pPr marL="2743200" algn="l" defTabSz="914400" rtl="0" eaLnBrk="1" latinLnBrk="0" hangingPunct="1">
+      <a:defRPr sz="1200" kern="1200">
+        <a:solidFill>
+          <a:schemeClr val="tx1"/>
+        </a:solidFill>
+        <a:latin typeface="+mn-lt"/>
+        <a:ea typeface="+mn-ea"/>
+        <a:cs typeface="+mn-cs"/>
+      </a:defRPr>
+    </a:lvl7pPr>
+    <a:lvl8pPr marL="3200400" algn="l" defTabSz="914400" rtl="0" eaLnBrk="1" latinLnBrk="0" hangingPunct="1">
+      <a:defRPr sz="1200" kern="1200">
+        <a:solidFill>
+          <a:schemeClr val="tx1"/>
+        </a:solidFill>
+        <a:latin typeface="+mn-lt"/>
+        <a:ea typeface="+mn-ea"/>
+        <a:cs typeface="+mn-cs"/>
+      </a:defRPr>
+    </a:lvl8pPr>
+    <a:lvl9pPr marL="3657600" algn="l" defTabSz="914400" rtl="0" eaLnBrk="1" latinLnBrk="0" hangingPunct="1">
+      <a:defRPr sz="1200" kern="1200">
+        <a:solidFill>
+          <a:schemeClr val="tx1"/>
+        </a:solidFill>
+        <a:latin typeface="+mn-lt"/>
+        <a:ea typeface="+mn-ea"/>
+        <a:cs typeface="+mn-cs"/>
+      </a:defRPr>
+    </a:lvl9pPr>
+  </p:notesStyle>
+</p:notesMaster>
+</file>
+
+<file path=ppt/notesSlides/notesSlide1.xml><?xml version="1.0" encoding="utf-8"?>
+<p:notes xmlns:a="http://schemas.openxmlformats.org/drawingml/2006/main" xmlns:r="http://schemas.openxmlformats.org/officeDocument/2006/relationships" xmlns:p="http://schemas.openxmlformats.org/presentationml/2006/main">
+  <p:cSld>
+    <p:spTree>
+      <p:nvGrpSpPr>
+        <p:cNvPr id="1" name=""/>
+        <p:cNvGrpSpPr/>
+        <p:nvPr/>
+      </p:nvGrpSpPr>
+      <p:grpSpPr>
+        <a:xfrm>
+          <a:off x="0" y="0"/>
+          <a:ext cx="0" cy="0"/>
+          <a:chOff x="0" y="0"/>
+          <a:chExt cx="0" cy="0"/>
+        </a:xfrm>
+      </p:grpSpPr>
+      <p:sp>
+        <p:nvSpPr>
+          <p:cNvPr id="2" name="Slide Image Placeholder 1"/>
+          <p:cNvSpPr>
+            <a:spLocks noGrp="1" noRot="1" noChangeAspect="1"/>
+          </p:cNvSpPr>
+          <p:nvPr>
+            <p:ph type="sldImg"/>
+          </p:nvPr>
+        </p:nvSpPr>
+        <p:spPr/>
+      </p:sp>
+      <p:sp>
+        <p:nvSpPr>
+          <p:cNvPr id="3" name="Notes Placeholder 2"/>
+          <p:cNvSpPr>
+            <a:spLocks noGrp="1"/>
+          </p:cNvSpPr>
+          <p:nvPr>
+            <p:ph type="body" idx="1"/>
+          </p:nvPr>
+        </p:nvSpPr>
+        <p:spPr/>
+        <p:txBody>
+          <a:bodyPr/>
+          <a:lstStyle/>
+          <a:p>
+            <a:r>
+              <a:rPr lang="en-US" dirty="0"/>
+              <a:t>Robustness score is invariant to mean. Instead, use coefficient of variation </a:t>
+            </a:r>
+          </a:p>
+          <a:p>
+            <a:r>
+              <a:rPr lang="en-US" dirty="0"/>
+              <a:t>Try violins/box plots for parameters</a:t>
+            </a:r>
+          </a:p>
+          <a:p>
+            <a:r>
+              <a:rPr lang="en-US" dirty="0"/>
+              <a:t>Bar plot with error bars</a:t>
+            </a:r>
+          </a:p>
+        </p:txBody>
+      </p:sp>
+      <p:sp>
+        <p:nvSpPr>
+          <p:cNvPr id="4" name="Slide Number Placeholder 3"/>
+          <p:cNvSpPr>
+            <a:spLocks noGrp="1"/>
+          </p:cNvSpPr>
+          <p:nvPr>
+            <p:ph type="sldNum" sz="quarter" idx="5"/>
+          </p:nvPr>
+        </p:nvSpPr>
+        <p:spPr/>
+        <p:txBody>
+          <a:bodyPr/>
+          <a:lstStyle/>
+          <a:p>
+            <a:fld id="{536CD67C-AC1D-3C49-A666-99E7C6339AFD}" type="slidenum">
+              <a:rPr lang="en-US" smtClean="0"/>
+              <a:t>5</a:t>
+            </a:fld>
+            <a:endParaRPr lang="en-US"/>
+          </a:p>
+        </p:txBody>
+      </p:sp>
+    </p:spTree>
+    <p:extLst>
+      <p:ext uri="{BB962C8B-B14F-4D97-AF65-F5344CB8AC3E}">
+        <p14:creationId xmlns:p14="http://schemas.microsoft.com/office/powerpoint/2010/main" val="2806294486"/>
+      </p:ext>
+    </p:extLst>
+  </p:cSld>
+  <p:clrMapOvr>
+    <a:masterClrMapping/>
+  </p:clrMapOvr>
+</p:notes>
 </file>
 
 <file path=ppt/slideLayouts/slideLayout1.xml><?xml version="1.0" encoding="utf-8"?>
@@ -270,7 +721,7 @@
           <a:p>
             <a:fld id="{0C47E950-7371-4A44-97D6-8899311B9D63}" type="datetimeFigureOut">
               <a:rPr lang="en-US" smtClean="0"/>
-              <a:t>6/16/22</a:t>
+              <a:t>6/20/22</a:t>
             </a:fld>
             <a:endParaRPr lang="en-US"/>
           </a:p>
@@ -468,7 +919,7 @@
           <a:p>
             <a:fld id="{0C47E950-7371-4A44-97D6-8899311B9D63}" type="datetimeFigureOut">
               <a:rPr lang="en-US" smtClean="0"/>
-              <a:t>6/16/22</a:t>
+              <a:t>6/20/22</a:t>
             </a:fld>
             <a:endParaRPr lang="en-US"/>
           </a:p>
@@ -676,7 +1127,7 @@
           <a:p>
             <a:fld id="{0C47E950-7371-4A44-97D6-8899311B9D63}" type="datetimeFigureOut">
               <a:rPr lang="en-US" smtClean="0"/>
-              <a:t>6/16/22</a:t>
+              <a:t>6/20/22</a:t>
             </a:fld>
             <a:endParaRPr lang="en-US"/>
           </a:p>
@@ -874,7 +1325,7 @@
           <a:p>
             <a:fld id="{0C47E950-7371-4A44-97D6-8899311B9D63}" type="datetimeFigureOut">
               <a:rPr lang="en-US" smtClean="0"/>
-              <a:t>6/16/22</a:t>
+              <a:t>6/20/22</a:t>
             </a:fld>
             <a:endParaRPr lang="en-US"/>
           </a:p>
@@ -1149,7 +1600,7 @@
           <a:p>
             <a:fld id="{0C47E950-7371-4A44-97D6-8899311B9D63}" type="datetimeFigureOut">
               <a:rPr lang="en-US" smtClean="0"/>
-              <a:t>6/16/22</a:t>
+              <a:t>6/20/22</a:t>
             </a:fld>
             <a:endParaRPr lang="en-US"/>
           </a:p>
@@ -1414,7 +1865,7 @@
           <a:p>
             <a:fld id="{0C47E950-7371-4A44-97D6-8899311B9D63}" type="datetimeFigureOut">
               <a:rPr lang="en-US" smtClean="0"/>
-              <a:t>6/16/22</a:t>
+              <a:t>6/20/22</a:t>
             </a:fld>
             <a:endParaRPr lang="en-US"/>
           </a:p>
@@ -1826,7 +2277,7 @@
           <a:p>
             <a:fld id="{0C47E950-7371-4A44-97D6-8899311B9D63}" type="datetimeFigureOut">
               <a:rPr lang="en-US" smtClean="0"/>
-              <a:t>6/16/22</a:t>
+              <a:t>6/20/22</a:t>
             </a:fld>
             <a:endParaRPr lang="en-US"/>
           </a:p>
@@ -1967,7 +2418,7 @@
           <a:p>
             <a:fld id="{0C47E950-7371-4A44-97D6-8899311B9D63}" type="datetimeFigureOut">
               <a:rPr lang="en-US" smtClean="0"/>
-              <a:t>6/16/22</a:t>
+              <a:t>6/20/22</a:t>
             </a:fld>
             <a:endParaRPr lang="en-US"/>
           </a:p>
@@ -2080,7 +2531,7 @@
           <a:p>
             <a:fld id="{0C47E950-7371-4A44-97D6-8899311B9D63}" type="datetimeFigureOut">
               <a:rPr lang="en-US" smtClean="0"/>
-              <a:t>6/16/22</a:t>
+              <a:t>6/20/22</a:t>
             </a:fld>
             <a:endParaRPr lang="en-US"/>
           </a:p>
@@ -2391,7 +2842,7 @@
           <a:p>
             <a:fld id="{0C47E950-7371-4A44-97D6-8899311B9D63}" type="datetimeFigureOut">
               <a:rPr lang="en-US" smtClean="0"/>
-              <a:t>6/16/22</a:t>
+              <a:t>6/20/22</a:t>
             </a:fld>
             <a:endParaRPr lang="en-US"/>
           </a:p>
@@ -2679,7 +3130,7 @@
           <a:p>
             <a:fld id="{0C47E950-7371-4A44-97D6-8899311B9D63}" type="datetimeFigureOut">
               <a:rPr lang="en-US" smtClean="0"/>
-              <a:t>6/16/22</a:t>
+              <a:t>6/20/22</a:t>
             </a:fld>
             <a:endParaRPr lang="en-US"/>
           </a:p>
@@ -2920,7 +3371,7 @@
           <a:p>
             <a:fld id="{0C47E950-7371-4A44-97D6-8899311B9D63}" type="datetimeFigureOut">
               <a:rPr lang="en-US" smtClean="0"/>
-              <a:t>6/16/22</a:t>
+              <a:t>6/20/22</a:t>
             </a:fld>
             <a:endParaRPr lang="en-US"/>
           </a:p>
@@ -13034,7 +13485,7 @@
         </p:nvGrpSpPr>
         <p:grpSpPr>
           <a:xfrm>
-            <a:off x="2833205" y="1098483"/>
+            <a:off x="2833205" y="1049055"/>
             <a:ext cx="5475908" cy="3162021"/>
             <a:chOff x="2833205" y="1098483"/>
             <a:chExt cx="5475908" cy="3162021"/>
@@ -16152,12 +16603,478 @@
           </a:prstGeom>
         </p:spPr>
       </p:pic>
+      <p:sp>
+        <p:nvSpPr>
+          <p:cNvPr id="9" name="Rectangle 8">
+            <a:extLst>
+              <a:ext uri="{FF2B5EF4-FFF2-40B4-BE49-F238E27FC236}">
+                <a16:creationId xmlns:a16="http://schemas.microsoft.com/office/drawing/2014/main" id="{34B44296-7635-728C-6323-270063CD75FA}"/>
+              </a:ext>
+            </a:extLst>
+          </p:cNvPr>
+          <p:cNvSpPr/>
+          <p:nvPr/>
+        </p:nvSpPr>
+        <p:spPr>
+          <a:xfrm>
+            <a:off x="5986082" y="2016494"/>
+            <a:ext cx="2466109" cy="595746"/>
+          </a:xfrm>
+          <a:prstGeom prst="rect">
+            <a:avLst/>
+          </a:prstGeom>
+          <a:noFill/>
+          <a:ln w="28575">
+            <a:solidFill>
+              <a:schemeClr val="tx1"/>
+            </a:solidFill>
+          </a:ln>
+        </p:spPr>
+        <p:style>
+          <a:lnRef idx="2">
+            <a:schemeClr val="accent1">
+              <a:shade val="50000"/>
+            </a:schemeClr>
+          </a:lnRef>
+          <a:fillRef idx="1">
+            <a:schemeClr val="accent1"/>
+          </a:fillRef>
+          <a:effectRef idx="0">
+            <a:schemeClr val="accent1"/>
+          </a:effectRef>
+          <a:fontRef idx="minor">
+            <a:schemeClr val="lt1"/>
+          </a:fontRef>
+        </p:style>
+        <p:txBody>
+          <a:bodyPr rtlCol="0" anchor="ctr"/>
+          <a:lstStyle/>
+          <a:p>
+            <a:pPr algn="ctr"/>
+            <a:r>
+              <a:rPr lang="en-US" sz="1600" dirty="0">
+                <a:solidFill>
+                  <a:schemeClr val="tx1"/>
+                </a:solidFill>
+                <a:latin typeface="Arial" panose="020B0604020202020204" pitchFamily="34" charset="0"/>
+                <a:cs typeface="Arial" panose="020B0604020202020204" pitchFamily="34" charset="0"/>
+              </a:rPr>
+              <a:t>Solve ODE and compute objective function</a:t>
+            </a:r>
+          </a:p>
+        </p:txBody>
+      </p:sp>
+      <p:sp>
+        <p:nvSpPr>
+          <p:cNvPr id="10" name="Rectangle 9">
+            <a:extLst>
+              <a:ext uri="{FF2B5EF4-FFF2-40B4-BE49-F238E27FC236}">
+                <a16:creationId xmlns:a16="http://schemas.microsoft.com/office/drawing/2014/main" id="{C105DD10-8CE4-DE1D-91FF-629553EA0C41}"/>
+              </a:ext>
+            </a:extLst>
+          </p:cNvPr>
+          <p:cNvSpPr/>
+          <p:nvPr/>
+        </p:nvSpPr>
+        <p:spPr>
+          <a:xfrm>
+            <a:off x="5986082" y="2998045"/>
+            <a:ext cx="2466109" cy="595746"/>
+          </a:xfrm>
+          <a:prstGeom prst="rect">
+            <a:avLst/>
+          </a:prstGeom>
+          <a:noFill/>
+          <a:ln w="28575">
+            <a:solidFill>
+              <a:schemeClr val="tx1"/>
+            </a:solidFill>
+          </a:ln>
+        </p:spPr>
+        <p:style>
+          <a:lnRef idx="2">
+            <a:schemeClr val="accent1">
+              <a:shade val="50000"/>
+            </a:schemeClr>
+          </a:lnRef>
+          <a:fillRef idx="1">
+            <a:schemeClr val="accent1"/>
+          </a:fillRef>
+          <a:effectRef idx="0">
+            <a:schemeClr val="accent1"/>
+          </a:effectRef>
+          <a:fontRef idx="minor">
+            <a:schemeClr val="lt1"/>
+          </a:fontRef>
+        </p:style>
+        <p:txBody>
+          <a:bodyPr rtlCol="0" anchor="ctr"/>
+          <a:lstStyle/>
+          <a:p>
+            <a:pPr algn="ctr"/>
+            <a:r>
+              <a:rPr lang="en-US" sz="1600" dirty="0">
+                <a:solidFill>
+                  <a:schemeClr val="tx1"/>
+                </a:solidFill>
+                <a:latin typeface="Arial" panose="020B0604020202020204" pitchFamily="34" charset="0"/>
+                <a:cs typeface="Arial" panose="020B0604020202020204" pitchFamily="34" charset="0"/>
+              </a:rPr>
+              <a:t>Fit landscape with nonparametric model</a:t>
+            </a:r>
+          </a:p>
+        </p:txBody>
+      </p:sp>
+      <p:sp>
+        <p:nvSpPr>
+          <p:cNvPr id="11" name="Rectangle 10">
+            <a:extLst>
+              <a:ext uri="{FF2B5EF4-FFF2-40B4-BE49-F238E27FC236}">
+                <a16:creationId xmlns:a16="http://schemas.microsoft.com/office/drawing/2014/main" id="{D05A6E1F-68E5-794B-A728-26EF9A28CBC1}"/>
+              </a:ext>
+            </a:extLst>
+          </p:cNvPr>
+          <p:cNvSpPr/>
+          <p:nvPr/>
+        </p:nvSpPr>
+        <p:spPr>
+          <a:xfrm>
+            <a:off x="5986082" y="3979596"/>
+            <a:ext cx="2466109" cy="997527"/>
+          </a:xfrm>
+          <a:prstGeom prst="rect">
+            <a:avLst/>
+          </a:prstGeom>
+          <a:noFill/>
+          <a:ln w="28575">
+            <a:solidFill>
+              <a:schemeClr val="tx1"/>
+            </a:solidFill>
+          </a:ln>
+        </p:spPr>
+        <p:style>
+          <a:lnRef idx="2">
+            <a:schemeClr val="accent1">
+              <a:shade val="50000"/>
+            </a:schemeClr>
+          </a:lnRef>
+          <a:fillRef idx="1">
+            <a:schemeClr val="accent1"/>
+          </a:fillRef>
+          <a:effectRef idx="0">
+            <a:schemeClr val="accent1"/>
+          </a:effectRef>
+          <a:fontRef idx="minor">
+            <a:schemeClr val="lt1"/>
+          </a:fontRef>
+        </p:style>
+        <p:txBody>
+          <a:bodyPr rtlCol="0" anchor="ctr"/>
+          <a:lstStyle/>
+          <a:p>
+            <a:pPr algn="ctr"/>
+            <a:r>
+              <a:rPr lang="en-US" sz="1600" dirty="0">
+                <a:solidFill>
+                  <a:schemeClr val="tx1"/>
+                </a:solidFill>
+                <a:latin typeface="Arial" panose="020B0604020202020204" pitchFamily="34" charset="0"/>
+                <a:cs typeface="Arial" panose="020B0604020202020204" pitchFamily="34" charset="0"/>
+              </a:rPr>
+              <a:t>Determine next sample balancing exploration and exploitation</a:t>
+            </a:r>
+          </a:p>
+        </p:txBody>
+      </p:sp>
+      <p:sp>
+        <p:nvSpPr>
+          <p:cNvPr id="12" name="Rectangle 11">
+            <a:extLst>
+              <a:ext uri="{FF2B5EF4-FFF2-40B4-BE49-F238E27FC236}">
+                <a16:creationId xmlns:a16="http://schemas.microsoft.com/office/drawing/2014/main" id="{5737B917-5B12-7E2D-E437-561E1FFC116D}"/>
+              </a:ext>
+            </a:extLst>
+          </p:cNvPr>
+          <p:cNvSpPr/>
+          <p:nvPr/>
+        </p:nvSpPr>
+        <p:spPr>
+          <a:xfrm>
+            <a:off x="5986082" y="1034943"/>
+            <a:ext cx="2466109" cy="595746"/>
+          </a:xfrm>
+          <a:prstGeom prst="rect">
+            <a:avLst/>
+          </a:prstGeom>
+          <a:noFill/>
+          <a:ln w="28575">
+            <a:solidFill>
+              <a:schemeClr val="tx1"/>
+            </a:solidFill>
+          </a:ln>
+        </p:spPr>
+        <p:style>
+          <a:lnRef idx="2">
+            <a:schemeClr val="accent1">
+              <a:shade val="50000"/>
+            </a:schemeClr>
+          </a:lnRef>
+          <a:fillRef idx="1">
+            <a:schemeClr val="accent1"/>
+          </a:fillRef>
+          <a:effectRef idx="0">
+            <a:schemeClr val="accent1"/>
+          </a:effectRef>
+          <a:fontRef idx="minor">
+            <a:schemeClr val="lt1"/>
+          </a:fontRef>
+        </p:style>
+        <p:txBody>
+          <a:bodyPr rtlCol="0" anchor="ctr"/>
+          <a:lstStyle/>
+          <a:p>
+            <a:pPr algn="ctr"/>
+            <a:r>
+              <a:rPr lang="en-US" sz="1600" dirty="0">
+                <a:solidFill>
+                  <a:schemeClr val="tx1"/>
+                </a:solidFill>
+                <a:latin typeface="Arial" panose="020B0604020202020204" pitchFamily="34" charset="0"/>
+                <a:cs typeface="Arial" panose="020B0604020202020204" pitchFamily="34" charset="0"/>
+              </a:rPr>
+              <a:t>Sample parameter space</a:t>
+            </a:r>
+          </a:p>
+        </p:txBody>
+      </p:sp>
+      <p:sp>
+        <p:nvSpPr>
+          <p:cNvPr id="14" name="Triangle 13">
+            <a:extLst>
+              <a:ext uri="{FF2B5EF4-FFF2-40B4-BE49-F238E27FC236}">
+                <a16:creationId xmlns:a16="http://schemas.microsoft.com/office/drawing/2014/main" id="{F13D2297-C006-9CFB-9467-23CCBA5502D8}"/>
+              </a:ext>
+            </a:extLst>
+          </p:cNvPr>
+          <p:cNvSpPr/>
+          <p:nvPr/>
+        </p:nvSpPr>
+        <p:spPr>
+          <a:xfrm rot="10800000">
+            <a:off x="7115227" y="1695713"/>
+            <a:ext cx="207818" cy="207815"/>
+          </a:xfrm>
+          <a:prstGeom prst="triangle">
+            <a:avLst/>
+          </a:prstGeom>
+          <a:solidFill>
+            <a:schemeClr val="tx1"/>
+          </a:solidFill>
+        </p:spPr>
+        <p:style>
+          <a:lnRef idx="2">
+            <a:schemeClr val="accent1">
+              <a:shade val="50000"/>
+            </a:schemeClr>
+          </a:lnRef>
+          <a:fillRef idx="1">
+            <a:schemeClr val="accent1"/>
+          </a:fillRef>
+          <a:effectRef idx="0">
+            <a:schemeClr val="accent1"/>
+          </a:effectRef>
+          <a:fontRef idx="minor">
+            <a:schemeClr val="lt1"/>
+          </a:fontRef>
+        </p:style>
+        <p:txBody>
+          <a:bodyPr rtlCol="0" anchor="ctr"/>
+          <a:lstStyle/>
+          <a:p>
+            <a:pPr algn="ctr"/>
+            <a:endParaRPr lang="en-US" sz="1600">
+              <a:latin typeface="Arial" panose="020B0604020202020204" pitchFamily="34" charset="0"/>
+              <a:cs typeface="Arial" panose="020B0604020202020204" pitchFamily="34" charset="0"/>
+            </a:endParaRPr>
+          </a:p>
+        </p:txBody>
+      </p:sp>
+      <p:sp>
+        <p:nvSpPr>
+          <p:cNvPr id="15" name="Triangle 14">
+            <a:extLst>
+              <a:ext uri="{FF2B5EF4-FFF2-40B4-BE49-F238E27FC236}">
+                <a16:creationId xmlns:a16="http://schemas.microsoft.com/office/drawing/2014/main" id="{79559EC9-A155-55F6-4A92-79DA1FEDA9AE}"/>
+              </a:ext>
+            </a:extLst>
+          </p:cNvPr>
+          <p:cNvSpPr/>
+          <p:nvPr/>
+        </p:nvSpPr>
+        <p:spPr>
+          <a:xfrm rot="10800000">
+            <a:off x="7115227" y="2701235"/>
+            <a:ext cx="207818" cy="207815"/>
+          </a:xfrm>
+          <a:prstGeom prst="triangle">
+            <a:avLst/>
+          </a:prstGeom>
+          <a:solidFill>
+            <a:schemeClr val="tx1"/>
+          </a:solidFill>
+        </p:spPr>
+        <p:style>
+          <a:lnRef idx="2">
+            <a:schemeClr val="accent1">
+              <a:shade val="50000"/>
+            </a:schemeClr>
+          </a:lnRef>
+          <a:fillRef idx="1">
+            <a:schemeClr val="accent1"/>
+          </a:fillRef>
+          <a:effectRef idx="0">
+            <a:schemeClr val="accent1"/>
+          </a:effectRef>
+          <a:fontRef idx="minor">
+            <a:schemeClr val="lt1"/>
+          </a:fontRef>
+        </p:style>
+        <p:txBody>
+          <a:bodyPr rtlCol="0" anchor="ctr"/>
+          <a:lstStyle/>
+          <a:p>
+            <a:pPr algn="ctr"/>
+            <a:endParaRPr lang="en-US" sz="1600">
+              <a:latin typeface="Arial" panose="020B0604020202020204" pitchFamily="34" charset="0"/>
+              <a:cs typeface="Arial" panose="020B0604020202020204" pitchFamily="34" charset="0"/>
+            </a:endParaRPr>
+          </a:p>
+        </p:txBody>
+      </p:sp>
+      <p:sp>
+        <p:nvSpPr>
+          <p:cNvPr id="16" name="Triangle 15">
+            <a:extLst>
+              <a:ext uri="{FF2B5EF4-FFF2-40B4-BE49-F238E27FC236}">
+                <a16:creationId xmlns:a16="http://schemas.microsoft.com/office/drawing/2014/main" id="{202272C6-74B9-8A53-EEDF-8FB663210DDD}"/>
+              </a:ext>
+            </a:extLst>
+          </p:cNvPr>
+          <p:cNvSpPr/>
+          <p:nvPr/>
+        </p:nvSpPr>
+        <p:spPr>
+          <a:xfrm rot="10800000">
+            <a:off x="7156789" y="3682786"/>
+            <a:ext cx="207818" cy="207815"/>
+          </a:xfrm>
+          <a:prstGeom prst="triangle">
+            <a:avLst/>
+          </a:prstGeom>
+          <a:solidFill>
+            <a:schemeClr val="tx1"/>
+          </a:solidFill>
+        </p:spPr>
+        <p:style>
+          <a:lnRef idx="2">
+            <a:schemeClr val="accent1">
+              <a:shade val="50000"/>
+            </a:schemeClr>
+          </a:lnRef>
+          <a:fillRef idx="1">
+            <a:schemeClr val="accent1"/>
+          </a:fillRef>
+          <a:effectRef idx="0">
+            <a:schemeClr val="accent1"/>
+          </a:effectRef>
+          <a:fontRef idx="minor">
+            <a:schemeClr val="lt1"/>
+          </a:fontRef>
+        </p:style>
+        <p:txBody>
+          <a:bodyPr rtlCol="0" anchor="ctr"/>
+          <a:lstStyle/>
+          <a:p>
+            <a:pPr algn="ctr"/>
+            <a:endParaRPr lang="en-US" sz="1600">
+              <a:latin typeface="Arial" panose="020B0604020202020204" pitchFamily="34" charset="0"/>
+              <a:cs typeface="Arial" panose="020B0604020202020204" pitchFamily="34" charset="0"/>
+            </a:endParaRPr>
+          </a:p>
+        </p:txBody>
+      </p:sp>
+      <p:sp>
+        <p:nvSpPr>
+          <p:cNvPr id="18" name="U-Turn Arrow 17">
+            <a:extLst>
+              <a:ext uri="{FF2B5EF4-FFF2-40B4-BE49-F238E27FC236}">
+                <a16:creationId xmlns:a16="http://schemas.microsoft.com/office/drawing/2014/main" id="{60258874-8907-F3E6-ED46-471D0427DDAF}"/>
+              </a:ext>
+            </a:extLst>
+          </p:cNvPr>
+          <p:cNvSpPr/>
+          <p:nvPr/>
+        </p:nvSpPr>
+        <p:spPr>
+          <a:xfrm rot="16200000" flipV="1">
+            <a:off x="6999331" y="2763852"/>
+            <a:ext cx="3261761" cy="188279"/>
+          </a:xfrm>
+          <a:prstGeom prst="uturnArrow">
+            <a:avLst>
+              <a:gd name="adj1" fmla="val 25000"/>
+              <a:gd name="adj2" fmla="val 25000"/>
+              <a:gd name="adj3" fmla="val 25000"/>
+              <a:gd name="adj4" fmla="val 43750"/>
+              <a:gd name="adj5" fmla="val 100000"/>
+            </a:avLst>
+          </a:prstGeom>
+          <a:solidFill>
+            <a:schemeClr val="tx1"/>
+          </a:solidFill>
+          <a:ln>
+            <a:solidFill>
+              <a:schemeClr val="tx1"/>
+            </a:solidFill>
+          </a:ln>
+        </p:spPr>
+        <p:style>
+          <a:lnRef idx="2">
+            <a:schemeClr val="accent1">
+              <a:shade val="50000"/>
+            </a:schemeClr>
+          </a:lnRef>
+          <a:fillRef idx="1">
+            <a:schemeClr val="accent1"/>
+          </a:fillRef>
+          <a:effectRef idx="0">
+            <a:schemeClr val="accent1"/>
+          </a:effectRef>
+          <a:fontRef idx="minor">
+            <a:schemeClr val="lt1"/>
+          </a:fontRef>
+        </p:style>
+        <p:txBody>
+          <a:bodyPr rtlCol="0" anchor="ctr"/>
+          <a:lstStyle/>
+          <a:p>
+            <a:pPr algn="ctr"/>
+            <a:endParaRPr lang="en-US" dirty="0">
+              <a:solidFill>
+                <a:schemeClr val="tx1"/>
+              </a:solidFill>
+              <a:latin typeface="Arial" panose="020B0604020202020204" pitchFamily="34" charset="0"/>
+              <a:cs typeface="Arial" panose="020B0604020202020204" pitchFamily="34" charset="0"/>
+            </a:endParaRPr>
+          </a:p>
+        </p:txBody>
+      </p:sp>
       <p:pic>
         <p:nvPicPr>
-          <p:cNvPr id="5" name="Picture 4" descr="Graphical user interface, application, icon&#10;&#10;Description automatically generated">
+          <p:cNvPr id="4" name="Picture 3" descr="A picture containing background pattern&#10;&#10;Description automatically generated">
             <a:extLst>
               <a:ext uri="{FF2B5EF4-FFF2-40B4-BE49-F238E27FC236}">
-                <a16:creationId xmlns:a16="http://schemas.microsoft.com/office/drawing/2014/main" id="{8264CFFA-68BC-8637-6DDF-D6CBF5DD63EC}"/>
+                <a16:creationId xmlns:a16="http://schemas.microsoft.com/office/drawing/2014/main" id="{156D4808-DEE3-9890-C371-C605E4163FDB}"/>
               </a:ext>
             </a:extLst>
           </p:cNvPr>
@@ -16174,8 +17091,8 @@
         </p:blipFill>
         <p:spPr>
           <a:xfrm>
-            <a:off x="832806" y="3856922"/>
-            <a:ext cx="4964238" cy="1241060"/>
+            <a:off x="1012074" y="3881459"/>
+            <a:ext cx="4775200" cy="1193800"/>
           </a:xfrm>
           <a:prstGeom prst="rect">
             <a:avLst/>
@@ -16184,10 +17101,100 @@
       </p:pic>
       <p:sp>
         <p:nvSpPr>
-          <p:cNvPr id="7" name="Rectangle 6">
+          <p:cNvPr id="6" name="TextBox 5">
             <a:extLst>
               <a:ext uri="{FF2B5EF4-FFF2-40B4-BE49-F238E27FC236}">
-                <a16:creationId xmlns:a16="http://schemas.microsoft.com/office/drawing/2014/main" id="{9A7ECE50-0B40-9619-C10F-896E3447AF87}"/>
+                <a16:creationId xmlns:a16="http://schemas.microsoft.com/office/drawing/2014/main" id="{424071C3-5DCC-EE9C-A380-5059E6D6FEC4}"/>
+              </a:ext>
+            </a:extLst>
+          </p:cNvPr>
+          <p:cNvSpPr txBox="1"/>
+          <p:nvPr/>
+        </p:nvSpPr>
+        <p:spPr>
+          <a:xfrm>
+            <a:off x="777613" y="4258602"/>
+            <a:ext cx="385042" cy="369332"/>
+          </a:xfrm>
+          <a:prstGeom prst="rect">
+            <a:avLst/>
+          </a:prstGeom>
+          <a:noFill/>
+        </p:spPr>
+        <p:txBody>
+          <a:bodyPr wrap="none" rtlCol="0">
+            <a:spAutoFit/>
+          </a:bodyPr>
+          <a:lstStyle/>
+          <a:p>
+            <a:r>
+              <a:rPr lang="en-US" dirty="0">
+                <a:latin typeface="Arial" panose="020B0604020202020204" pitchFamily="34" charset="0"/>
+                <a:cs typeface="Arial" panose="020B0604020202020204" pitchFamily="34" charset="0"/>
+              </a:rPr>
+              <a:t>k</a:t>
+            </a:r>
+            <a:r>
+              <a:rPr lang="en-US" baseline="-25000" dirty="0">
+                <a:latin typeface="Arial" panose="020B0604020202020204" pitchFamily="34" charset="0"/>
+                <a:cs typeface="Arial" panose="020B0604020202020204" pitchFamily="34" charset="0"/>
+              </a:rPr>
+              <a:t>1</a:t>
+            </a:r>
+          </a:p>
+        </p:txBody>
+      </p:sp>
+      <p:sp>
+        <p:nvSpPr>
+          <p:cNvPr id="17" name="TextBox 16">
+            <a:extLst>
+              <a:ext uri="{FF2B5EF4-FFF2-40B4-BE49-F238E27FC236}">
+                <a16:creationId xmlns:a16="http://schemas.microsoft.com/office/drawing/2014/main" id="{18D48C54-7ED7-FA61-F5E1-457D692FB66F}"/>
+              </a:ext>
+            </a:extLst>
+          </p:cNvPr>
+          <p:cNvSpPr txBox="1"/>
+          <p:nvPr/>
+        </p:nvSpPr>
+        <p:spPr>
+          <a:xfrm>
+            <a:off x="3216923" y="5077113"/>
+            <a:ext cx="385042" cy="369332"/>
+          </a:xfrm>
+          <a:prstGeom prst="rect">
+            <a:avLst/>
+          </a:prstGeom>
+          <a:noFill/>
+        </p:spPr>
+        <p:txBody>
+          <a:bodyPr wrap="none" rtlCol="0">
+            <a:spAutoFit/>
+          </a:bodyPr>
+          <a:lstStyle/>
+          <a:p>
+            <a:r>
+              <a:rPr lang="en-US" dirty="0">
+                <a:latin typeface="Arial" panose="020B0604020202020204" pitchFamily="34" charset="0"/>
+                <a:cs typeface="Arial" panose="020B0604020202020204" pitchFamily="34" charset="0"/>
+              </a:rPr>
+              <a:t>k</a:t>
+            </a:r>
+            <a:r>
+              <a:rPr lang="en-US" baseline="-25000" dirty="0">
+                <a:latin typeface="Arial" panose="020B0604020202020204" pitchFamily="34" charset="0"/>
+                <a:cs typeface="Arial" panose="020B0604020202020204" pitchFamily="34" charset="0"/>
+              </a:rPr>
+              <a:t>2</a:t>
+            </a:r>
+          </a:p>
+        </p:txBody>
+      </p:sp>
+      <p:sp>
+        <p:nvSpPr>
+          <p:cNvPr id="8" name="Right Bracket 7">
+            <a:extLst>
+              <a:ext uri="{FF2B5EF4-FFF2-40B4-BE49-F238E27FC236}">
+                <a16:creationId xmlns:a16="http://schemas.microsoft.com/office/drawing/2014/main" id="{6BE496A3-9700-4F8D-90C9-E3D10FD76466}"/>
               </a:ext>
             </a:extLst>
           </p:cNvPr>
@@ -16195,34 +17202,31 @@
           <p:nvPr/>
         </p:nvSpPr>
         <p:spPr>
-          <a:xfrm>
-            <a:off x="5986081" y="525983"/>
-            <a:ext cx="4323171" cy="4572000"/>
+          <a:xfrm rot="5400000">
+            <a:off x="3350604" y="3226634"/>
+            <a:ext cx="98137" cy="3599117"/>
           </a:xfrm>
-          <a:prstGeom prst="rect">
+          <a:prstGeom prst="rightBracket">
             <a:avLst/>
           </a:prstGeom>
-          <a:noFill/>
-          <a:ln>
+          <a:ln w="28575">
             <a:solidFill>
               <a:schemeClr val="tx1"/>
             </a:solidFill>
           </a:ln>
         </p:spPr>
         <p:style>
-          <a:lnRef idx="2">
-            <a:schemeClr val="dk1">
-              <a:shade val="50000"/>
-            </a:schemeClr>
+          <a:lnRef idx="1">
+            <a:schemeClr val="accent1"/>
           </a:lnRef>
-          <a:fillRef idx="1">
-            <a:schemeClr val="dk1"/>
+          <a:fillRef idx="0">
+            <a:schemeClr val="accent1"/>
           </a:fillRef>
           <a:effectRef idx="0">
-            <a:schemeClr val="dk1"/>
+            <a:schemeClr val="accent1"/>
           </a:effectRef>
           <a:fontRef idx="minor">
-            <a:schemeClr val="lt1"/>
+            <a:schemeClr val="tx1"/>
           </a:fontRef>
         </p:style>
         <p:txBody>
@@ -16230,16 +17234,7 @@
           <a:lstStyle/>
           <a:p>
             <a:pPr algn="ctr"/>
-            <a:r>
-              <a:rPr lang="en-US" dirty="0">
-                <a:solidFill>
-                  <a:schemeClr val="tx1"/>
-                </a:solidFill>
-                <a:latin typeface="Arial" panose="020B0604020202020204" pitchFamily="34" charset="0"/>
-                <a:cs typeface="Arial" panose="020B0604020202020204" pitchFamily="34" charset="0"/>
-              </a:rPr>
-              <a:t>Schematic of Bayesian Optimization</a:t>
-            </a:r>
+            <a:endParaRPr lang="en-US"/>
           </a:p>
         </p:txBody>
       </p:sp>
@@ -16253,6 +17248,84 @@
   <p:clrMapOvr>
     <a:masterClrMapping/>
   </p:clrMapOvr>
+  <p:timing>
+    <p:tnLst>
+      <p:par>
+        <p:cTn id="1" dur="indefinite" restart="never" nodeType="tmRoot">
+          <p:childTnLst>
+            <p:seq concurrent="1" nextAc="seek">
+              <p:cTn id="2" dur="indefinite" nodeType="mainSeq">
+                <p:childTnLst>
+                  <p:par>
+                    <p:cTn id="3" fill="hold">
+                      <p:stCondLst>
+                        <p:cond delay="indefinite"/>
+                      </p:stCondLst>
+                      <p:childTnLst>
+                        <p:par>
+                          <p:cTn id="4" fill="hold">
+                            <p:stCondLst>
+                              <p:cond delay="0"/>
+                            </p:stCondLst>
+                            <p:childTnLst>
+                              <p:par>
+                                <p:cTn id="5" presetID="1" presetClass="entr" presetSubtype="0" fill="hold" grpId="0" nodeType="clickEffect">
+                                  <p:stCondLst>
+                                    <p:cond delay="0"/>
+                                  </p:stCondLst>
+                                  <p:childTnLst>
+                                    <p:set>
+                                      <p:cBhvr>
+                                        <p:cTn id="6" dur="1" fill="hold">
+                                          <p:stCondLst>
+                                            <p:cond delay="0"/>
+                                          </p:stCondLst>
+                                        </p:cTn>
+                                        <p:tgtEl>
+                                          <p:spTgt spid="18"/>
+                                        </p:tgtEl>
+                                        <p:attrNameLst>
+                                          <p:attrName>style.visibility</p:attrName>
+                                        </p:attrNameLst>
+                                      </p:cBhvr>
+                                      <p:to>
+                                        <p:strVal val="visible"/>
+                                      </p:to>
+                                    </p:set>
+                                  </p:childTnLst>
+                                </p:cTn>
+                              </p:par>
+                            </p:childTnLst>
+                          </p:cTn>
+                        </p:par>
+                      </p:childTnLst>
+                    </p:cTn>
+                  </p:par>
+                </p:childTnLst>
+              </p:cTn>
+              <p:prevCondLst>
+                <p:cond evt="onPrev" delay="0">
+                  <p:tgtEl>
+                    <p:sldTgt/>
+                  </p:tgtEl>
+                </p:cond>
+              </p:prevCondLst>
+              <p:nextCondLst>
+                <p:cond evt="onNext" delay="0">
+                  <p:tgtEl>
+                    <p:sldTgt/>
+                  </p:tgtEl>
+                </p:cond>
+              </p:nextCondLst>
+            </p:seq>
+          </p:childTnLst>
+        </p:cTn>
+      </p:par>
+    </p:tnLst>
+    <p:bldLst>
+      <p:bldP spid="18" grpId="0" animBg="1"/>
+    </p:bldLst>
+  </p:timing>
 </p:sld>
 </file>
 
@@ -16560,14 +17633,14 @@
           <p:nvPr/>
         </p:nvPicPr>
         <p:blipFill>
-          <a:blip r:embed="rId2"/>
+          <a:blip r:embed="rId3"/>
           <a:stretch>
             <a:fillRect/>
           </a:stretch>
         </p:blipFill>
         <p:spPr>
           <a:xfrm>
-            <a:off x="6313381" y="849516"/>
+            <a:off x="7728896" y="3785727"/>
             <a:ext cx="3573981" cy="2233738"/>
           </a:xfrm>
           <a:prstGeom prst="rect">
@@ -16590,14 +17663,14 @@
           <p:nvPr/>
         </p:nvPicPr>
         <p:blipFill>
-          <a:blip r:embed="rId3"/>
+          <a:blip r:embed="rId4"/>
           <a:stretch>
             <a:fillRect/>
           </a:stretch>
         </p:blipFill>
         <p:spPr>
           <a:xfrm>
-            <a:off x="2444041" y="631179"/>
+            <a:off x="1458203" y="631178"/>
             <a:ext cx="3869340" cy="2573268"/>
           </a:xfrm>
           <a:prstGeom prst="rect">
@@ -16620,15 +17693,45 @@
           <p:nvPr/>
         </p:nvPicPr>
         <p:blipFill>
-          <a:blip r:embed="rId4"/>
+          <a:blip r:embed="rId5"/>
           <a:stretch>
             <a:fillRect/>
           </a:stretch>
         </p:blipFill>
         <p:spPr>
           <a:xfrm>
-            <a:off x="2447840" y="3204446"/>
+            <a:off x="1549741" y="3542925"/>
             <a:ext cx="7555604" cy="3022241"/>
+          </a:xfrm>
+          <a:prstGeom prst="rect">
+            <a:avLst/>
+          </a:prstGeom>
+        </p:spPr>
+      </p:pic>
+      <p:pic>
+        <p:nvPicPr>
+          <p:cNvPr id="4" name="Picture 3" descr="Chart&#10;&#10;Description automatically generated">
+            <a:extLst>
+              <a:ext uri="{FF2B5EF4-FFF2-40B4-BE49-F238E27FC236}">
+                <a16:creationId xmlns:a16="http://schemas.microsoft.com/office/drawing/2014/main" id="{64B8BD78-A2D8-AB5C-662B-6E7E904576A3}"/>
+              </a:ext>
+            </a:extLst>
+          </p:cNvPr>
+          <p:cNvPicPr>
+            <a:picLocks noChangeAspect="1"/>
+          </p:cNvPicPr>
+          <p:nvPr/>
+        </p:nvPicPr>
+        <p:blipFill>
+          <a:blip r:embed="rId6"/>
+          <a:stretch>
+            <a:fillRect/>
+          </a:stretch>
+        </p:blipFill>
+        <p:spPr>
+          <a:xfrm>
+            <a:off x="5813524" y="631178"/>
+            <a:ext cx="5230920" cy="2441096"/>
           </a:xfrm>
           <a:prstGeom prst="rect">
             <a:avLst/>
@@ -19916,4 +21019,299 @@
     </a:ext>
   </a:extLst>
 </a:theme>
+</file>
+
+<file path=ppt/theme/theme2.xml><?xml version="1.0" encoding="utf-8"?>
+<a:theme xmlns:a="http://schemas.openxmlformats.org/drawingml/2006/main" name="Office Theme">
+  <a:themeElements>
+    <a:clrScheme name="Office">
+      <a:dk1>
+        <a:sysClr val="windowText" lastClr="000000"/>
+      </a:dk1>
+      <a:lt1>
+        <a:sysClr val="window" lastClr="FFFFFF"/>
+      </a:lt1>
+      <a:dk2>
+        <a:srgbClr val="44546A"/>
+      </a:dk2>
+      <a:lt2>
+        <a:srgbClr val="E7E6E6"/>
+      </a:lt2>
+      <a:accent1>
+        <a:srgbClr val="4472C4"/>
+      </a:accent1>
+      <a:accent2>
+        <a:srgbClr val="ED7D31"/>
+      </a:accent2>
+      <a:accent3>
+        <a:srgbClr val="A5A5A5"/>
+      </a:accent3>
+      <a:accent4>
+        <a:srgbClr val="FFC000"/>
+      </a:accent4>
+      <a:accent5>
+        <a:srgbClr val="5B9BD5"/>
+      </a:accent5>
+      <a:accent6>
+        <a:srgbClr val="70AD47"/>
+      </a:accent6>
+      <a:hlink>
+        <a:srgbClr val="0563C1"/>
+      </a:hlink>
+      <a:folHlink>
+        <a:srgbClr val="954F72"/>
+      </a:folHlink>
+    </a:clrScheme>
+    <a:fontScheme name="Office">
+      <a:majorFont>
+        <a:latin typeface="Calibri Light" panose="020F0302020204030204"/>
+        <a:ea typeface=""/>
+        <a:cs typeface=""/>
+        <a:font script="Jpan" typeface="游ゴシック Light"/>
+        <a:font script="Hang" typeface="맑은 고딕"/>
+        <a:font script="Hans" typeface="等线 Light"/>
+        <a:font script="Hant" typeface="新細明體"/>
+        <a:font script="Arab" typeface="Times New Roman"/>
+        <a:font script="Hebr" typeface="Times New Roman"/>
+        <a:font script="Thai" typeface="Angsana New"/>
+        <a:font script="Ethi" typeface="Nyala"/>
+        <a:font script="Beng" typeface="Vrinda"/>
+        <a:font script="Gujr" typeface="Shruti"/>
+        <a:font script="Khmr" typeface="MoolBoran"/>
+        <a:font script="Knda" typeface="Tunga"/>
+        <a:font script="Guru" typeface="Raavi"/>
+        <a:font script="Cans" typeface="Euphemia"/>
+        <a:font script="Cher" typeface="Plantagenet Cherokee"/>
+        <a:font script="Yiii" typeface="Microsoft Yi Baiti"/>
+        <a:font script="Tibt" typeface="Microsoft Himalaya"/>
+        <a:font script="Thaa" typeface="MV Boli"/>
+        <a:font script="Deva" typeface="Mangal"/>
+        <a:font script="Telu" typeface="Gautami"/>
+        <a:font script="Taml" typeface="Latha"/>
+        <a:font script="Syrc" typeface="Estrangelo Edessa"/>
+        <a:font script="Orya" typeface="Kalinga"/>
+        <a:font script="Mlym" typeface="Kartika"/>
+        <a:font script="Laoo" typeface="DokChampa"/>
+        <a:font script="Sinh" typeface="Iskoola Pota"/>
+        <a:font script="Mong" typeface="Mongolian Baiti"/>
+        <a:font script="Viet" typeface="Times New Roman"/>
+        <a:font script="Uigh" typeface="Microsoft Uighur"/>
+        <a:font script="Geor" typeface="Sylfaen"/>
+        <a:font script="Armn" typeface="Arial"/>
+        <a:font script="Bugi" typeface="Leelawadee UI"/>
+        <a:font script="Bopo" typeface="Microsoft JhengHei"/>
+        <a:font script="Java" typeface="Javanese Text"/>
+        <a:font script="Lisu" typeface="Segoe UI"/>
+        <a:font script="Mymr" typeface="Myanmar Text"/>
+        <a:font script="Nkoo" typeface="Ebrima"/>
+        <a:font script="Olck" typeface="Nirmala UI"/>
+        <a:font script="Osma" typeface="Ebrima"/>
+        <a:font script="Phag" typeface="Phagspa"/>
+        <a:font script="Syrn" typeface="Estrangelo Edessa"/>
+        <a:font script="Syrj" typeface="Estrangelo Edessa"/>
+        <a:font script="Syre" typeface="Estrangelo Edessa"/>
+        <a:font script="Sora" typeface="Nirmala UI"/>
+        <a:font script="Tale" typeface="Microsoft Tai Le"/>
+        <a:font script="Talu" typeface="Microsoft New Tai Lue"/>
+        <a:font script="Tfng" typeface="Ebrima"/>
+      </a:majorFont>
+      <a:minorFont>
+        <a:latin typeface="Calibri" panose="020F0502020204030204"/>
+        <a:ea typeface=""/>
+        <a:cs typeface=""/>
+        <a:font script="Jpan" typeface="游ゴシック"/>
+        <a:font script="Hang" typeface="맑은 고딕"/>
+        <a:font script="Hans" typeface="等线"/>
+        <a:font script="Hant" typeface="新細明體"/>
+        <a:font script="Arab" typeface="Arial"/>
+        <a:font script="Hebr" typeface="Arial"/>
+        <a:font script="Thai" typeface="Cordia New"/>
+        <a:font script="Ethi" typeface="Nyala"/>
+        <a:font script="Beng" typeface="Vrinda"/>
+        <a:font script="Gujr" typeface="Shruti"/>
+        <a:font script="Khmr" typeface="DaunPenh"/>
+        <a:font script="Knda" typeface="Tunga"/>
+        <a:font script="Guru" typeface="Raavi"/>
+        <a:font script="Cans" typeface="Euphemia"/>
+        <a:font script="Cher" typeface="Plantagenet Cherokee"/>
+        <a:font script="Yiii" typeface="Microsoft Yi Baiti"/>
+        <a:font script="Tibt" typeface="Microsoft Himalaya"/>
+        <a:font script="Thaa" typeface="MV Boli"/>
+        <a:font script="Deva" typeface="Mangal"/>
+        <a:font script="Telu" typeface="Gautami"/>
+        <a:font script="Taml" typeface="Latha"/>
+        <a:font script="Syrc" typeface="Estrangelo Edessa"/>
+        <a:font script="Orya" typeface="Kalinga"/>
+        <a:font script="Mlym" typeface="Kartika"/>
+        <a:font script="Laoo" typeface="DokChampa"/>
+        <a:font script="Sinh" typeface="Iskoola Pota"/>
+        <a:font script="Mong" typeface="Mongolian Baiti"/>
+        <a:font script="Viet" typeface="Arial"/>
+        <a:font script="Uigh" typeface="Microsoft Uighur"/>
+        <a:font script="Geor" typeface="Sylfaen"/>
+        <a:font script="Armn" typeface="Arial"/>
+        <a:font script="Bugi" typeface="Leelawadee UI"/>
+        <a:font script="Bopo" typeface="Microsoft JhengHei"/>
+        <a:font script="Java" typeface="Javanese Text"/>
+        <a:font script="Lisu" typeface="Segoe UI"/>
+        <a:font script="Mymr" typeface="Myanmar Text"/>
+        <a:font script="Nkoo" typeface="Ebrima"/>
+        <a:font script="Olck" typeface="Nirmala UI"/>
+        <a:font script="Osma" typeface="Ebrima"/>
+        <a:font script="Phag" typeface="Phagspa"/>
+        <a:font script="Syrn" typeface="Estrangelo Edessa"/>
+        <a:font script="Syrj" typeface="Estrangelo Edessa"/>
+        <a:font script="Syre" typeface="Estrangelo Edessa"/>
+        <a:font script="Sora" typeface="Nirmala UI"/>
+        <a:font script="Tale" typeface="Microsoft Tai Le"/>
+        <a:font script="Talu" typeface="Microsoft New Tai Lue"/>
+        <a:font script="Tfng" typeface="Ebrima"/>
+      </a:minorFont>
+    </a:fontScheme>
+    <a:fmtScheme name="Office">
+      <a:fillStyleLst>
+        <a:solidFill>
+          <a:schemeClr val="phClr"/>
+        </a:solidFill>
+        <a:gradFill rotWithShape="1">
+          <a:gsLst>
+            <a:gs pos="0">
+              <a:schemeClr val="phClr">
+                <a:lumMod val="110000"/>
+                <a:satMod val="105000"/>
+                <a:tint val="67000"/>
+              </a:schemeClr>
+            </a:gs>
+            <a:gs pos="50000">
+              <a:schemeClr val="phClr">
+                <a:lumMod val="105000"/>
+                <a:satMod val="103000"/>
+                <a:tint val="73000"/>
+              </a:schemeClr>
+            </a:gs>
+            <a:gs pos="100000">
+              <a:schemeClr val="phClr">
+                <a:lumMod val="105000"/>
+                <a:satMod val="109000"/>
+                <a:tint val="81000"/>
+              </a:schemeClr>
+            </a:gs>
+          </a:gsLst>
+          <a:lin ang="5400000" scaled="0"/>
+        </a:gradFill>
+        <a:gradFill rotWithShape="1">
+          <a:gsLst>
+            <a:gs pos="0">
+              <a:schemeClr val="phClr">
+                <a:satMod val="103000"/>
+                <a:lumMod val="102000"/>
+                <a:tint val="94000"/>
+              </a:schemeClr>
+            </a:gs>
+            <a:gs pos="50000">
+              <a:schemeClr val="phClr">
+                <a:satMod val="110000"/>
+                <a:lumMod val="100000"/>
+                <a:shade val="100000"/>
+              </a:schemeClr>
+            </a:gs>
+            <a:gs pos="100000">
+              <a:schemeClr val="phClr">
+                <a:lumMod val="99000"/>
+                <a:satMod val="120000"/>
+                <a:shade val="78000"/>
+              </a:schemeClr>
+            </a:gs>
+          </a:gsLst>
+          <a:lin ang="5400000" scaled="0"/>
+        </a:gradFill>
+      </a:fillStyleLst>
+      <a:lnStyleLst>
+        <a:ln w="6350" cap="flat" cmpd="sng" algn="ctr">
+          <a:solidFill>
+            <a:schemeClr val="phClr"/>
+          </a:solidFill>
+          <a:prstDash val="solid"/>
+          <a:miter lim="800000"/>
+        </a:ln>
+        <a:ln w="12700" cap="flat" cmpd="sng" algn="ctr">
+          <a:solidFill>
+            <a:schemeClr val="phClr"/>
+          </a:solidFill>
+          <a:prstDash val="solid"/>
+          <a:miter lim="800000"/>
+        </a:ln>
+        <a:ln w="19050" cap="flat" cmpd="sng" algn="ctr">
+          <a:solidFill>
+            <a:schemeClr val="phClr"/>
+          </a:solidFill>
+          <a:prstDash val="solid"/>
+          <a:miter lim="800000"/>
+        </a:ln>
+      </a:lnStyleLst>
+      <a:effectStyleLst>
+        <a:effectStyle>
+          <a:effectLst/>
+        </a:effectStyle>
+        <a:effectStyle>
+          <a:effectLst/>
+        </a:effectStyle>
+        <a:effectStyle>
+          <a:effectLst>
+            <a:outerShdw blurRad="57150" dist="19050" dir="5400000" algn="ctr" rotWithShape="0">
+              <a:srgbClr val="000000">
+                <a:alpha val="63000"/>
+              </a:srgbClr>
+            </a:outerShdw>
+          </a:effectLst>
+        </a:effectStyle>
+      </a:effectStyleLst>
+      <a:bgFillStyleLst>
+        <a:solidFill>
+          <a:schemeClr val="phClr"/>
+        </a:solidFill>
+        <a:solidFill>
+          <a:schemeClr val="phClr">
+            <a:tint val="95000"/>
+            <a:satMod val="170000"/>
+          </a:schemeClr>
+        </a:solidFill>
+        <a:gradFill rotWithShape="1">
+          <a:gsLst>
+            <a:gs pos="0">
+              <a:schemeClr val="phClr">
+                <a:tint val="93000"/>
+                <a:satMod val="150000"/>
+                <a:shade val="98000"/>
+                <a:lumMod val="102000"/>
+              </a:schemeClr>
+            </a:gs>
+            <a:gs pos="50000">
+              <a:schemeClr val="phClr">
+                <a:tint val="98000"/>
+                <a:satMod val="130000"/>
+                <a:shade val="90000"/>
+                <a:lumMod val="103000"/>
+              </a:schemeClr>
+            </a:gs>
+            <a:gs pos="100000">
+              <a:schemeClr val="phClr">
+                <a:shade val="63000"/>
+                <a:satMod val="120000"/>
+              </a:schemeClr>
+            </a:gs>
+          </a:gsLst>
+          <a:lin ang="5400000" scaled="0"/>
+        </a:gradFill>
+      </a:bgFillStyleLst>
+    </a:fmtScheme>
+  </a:themeElements>
+  <a:objectDefaults/>
+  <a:extraClrSchemeLst/>
+  <a:extLst>
+    <a:ext uri="{05A4C25C-085E-4340-85A3-A5531E510DB2}">
+      <thm15:themeFamily xmlns:thm15="http://schemas.microsoft.com/office/thememl/2012/main" name="Office Theme" id="{62F939B6-93AF-4DB8-9C6B-D6C7DFDC589F}" vid="{4A3C46E8-61CC-4603-A589-7422A47A8E4A}"/>
+    </a:ext>
+  </a:extLst>
+</a:theme>
 </file>
</xml_diff>